<commit_message>
Plotting ECM 3 for all data sets and putting things in gitignore
</commit_message>
<xml_diff>
--- a/veilederpresentasjoner/22.10.2024.pptx
+++ b/veilederpresentasjoner/22.10.2024.pptx
@@ -13,6 +13,8 @@
     <p:sldId id="262" r:id="rId7"/>
     <p:sldId id="260" r:id="rId8"/>
     <p:sldId id="263" r:id="rId9"/>
+    <p:sldId id="264" r:id="rId10"/>
+    <p:sldId id="265" r:id="rId11"/>
   </p:sldIdLst>
   <p:sldSz cx="12192000" cy="6858000"/>
   <p:notesSz cx="6858000" cy="9144000"/>
@@ -3418,6 +3420,86 @@
 </p:sld>
 </file>
 
+<file path=ppt/slides/slide10.xml><?xml version="1.0" encoding="utf-8"?>
+<p:sld xmlns:a="http://schemas.openxmlformats.org/drawingml/2006/main" xmlns:r="http://schemas.openxmlformats.org/officeDocument/2006/relationships" xmlns:p="http://schemas.openxmlformats.org/presentationml/2006/main">
+  <p:cSld>
+    <p:spTree>
+      <p:nvGrpSpPr>
+        <p:cNvPr id="1" name=""/>
+        <p:cNvGrpSpPr/>
+        <p:nvPr/>
+      </p:nvGrpSpPr>
+      <p:grpSpPr>
+        <a:xfrm>
+          <a:off x="0" y="0"/>
+          <a:ext cx="0" cy="0"/>
+          <a:chOff x="0" y="0"/>
+          <a:chExt cx="0" cy="0"/>
+        </a:xfrm>
+      </p:grpSpPr>
+      <p:sp>
+        <p:nvSpPr>
+          <p:cNvPr id="2" name="Title 1">
+            <a:extLst>
+              <a:ext uri="{FF2B5EF4-FFF2-40B4-BE49-F238E27FC236}">
+                <a16:creationId xmlns:a16="http://schemas.microsoft.com/office/drawing/2014/main" id="{992429EE-1F3E-F027-50E8-BFD58A529089}"/>
+              </a:ext>
+            </a:extLst>
+          </p:cNvPr>
+          <p:cNvSpPr>
+            <a:spLocks noGrp="1"/>
+          </p:cNvSpPr>
+          <p:nvPr>
+            <p:ph type="title"/>
+          </p:nvPr>
+        </p:nvSpPr>
+        <p:spPr/>
+        <p:txBody>
+          <a:bodyPr/>
+          <a:lstStyle/>
+          <a:p>
+            <a:endParaRPr lang="en-NO"/>
+          </a:p>
+        </p:txBody>
+      </p:sp>
+      <p:sp>
+        <p:nvSpPr>
+          <p:cNvPr id="3" name="Content Placeholder 2">
+            <a:extLst>
+              <a:ext uri="{FF2B5EF4-FFF2-40B4-BE49-F238E27FC236}">
+                <a16:creationId xmlns:a16="http://schemas.microsoft.com/office/drawing/2014/main" id="{F3B32567-79BF-C9C5-F30E-07AC928DF941}"/>
+              </a:ext>
+            </a:extLst>
+          </p:cNvPr>
+          <p:cNvSpPr>
+            <a:spLocks noGrp="1"/>
+          </p:cNvSpPr>
+          <p:nvPr>
+            <p:ph idx="1"/>
+          </p:nvPr>
+        </p:nvSpPr>
+        <p:spPr/>
+        <p:txBody>
+          <a:bodyPr/>
+          <a:lstStyle/>
+          <a:p>
+            <a:endParaRPr lang="en-NO"/>
+          </a:p>
+        </p:txBody>
+      </p:sp>
+    </p:spTree>
+    <p:extLst>
+      <p:ext uri="{BB962C8B-B14F-4D97-AF65-F5344CB8AC3E}">
+        <p14:creationId xmlns:p14="http://schemas.microsoft.com/office/powerpoint/2010/main" val="2462881164"/>
+      </p:ext>
+    </p:extLst>
+  </p:cSld>
+  <p:clrMapOvr>
+    <a:masterClrMapping/>
+  </p:clrMapOvr>
+</p:sld>
+</file>
+
 <file path=ppt/slides/slide2.xml><?xml version="1.0" encoding="utf-8"?>
 <p:sld xmlns:a="http://schemas.openxmlformats.org/drawingml/2006/main" xmlns:r="http://schemas.openxmlformats.org/officeDocument/2006/relationships" xmlns:p="http://schemas.openxmlformats.org/presentationml/2006/main">
   <p:cSld>
@@ -3509,31 +3591,7 @@
             </a:r>
           </a:p>
           <a:p>
-            <a:pPr lvl="1"/>
-            <a:r>
-              <a:rPr lang="en-GB" dirty="0">
-                <a:sym typeface="Wingdings" pitchFamily="2" charset="2"/>
-              </a:rPr>
-              <a:t>V</a:t>
-            </a:r>
-            <a:r>
-              <a:rPr lang="en-NO" dirty="0">
-                <a:sym typeface="Wingdings" pitchFamily="2" charset="2"/>
-              </a:rPr>
-              <a:t>elger å tilpasse ECM til degraderingssteg “1” (0 degradering)</a:t>
-            </a:r>
-          </a:p>
-          <a:p>
-            <a:pPr lvl="1"/>
-            <a:r>
-              <a:rPr lang="en-NO" dirty="0">
-                <a:sym typeface="Wingdings" pitchFamily="2" charset="2"/>
-              </a:rPr>
-              <a:t>Se hvordan parametre endrer seg fra steg til steg (1- 5)</a:t>
-            </a:r>
-          </a:p>
-          <a:p>
-            <a:pPr marL="457200" lvl="1" indent="0">
+            <a:pPr marL="0" indent="0">
               <a:buNone/>
             </a:pPr>
             <a:endParaRPr lang="en-NO" dirty="0">
@@ -3554,7 +3612,7 @@
                 </a:solidFill>
                 <a:sym typeface="Wingdings" pitchFamily="2" charset="2"/>
               </a:rPr>
-              <a:t>minst feil </a:t>
+              <a:t>gjennomsnittlig minst feil </a:t>
             </a:r>
             <a:r>
               <a:rPr lang="en-GB" dirty="0" err="1">
@@ -3572,17 +3630,27 @@
               <a:rPr lang="en-GB" dirty="0" err="1">
                 <a:sym typeface="Wingdings" pitchFamily="2" charset="2"/>
               </a:rPr>
-              <a:t>degraderingssteg</a:t>
-            </a:r>
-            <a:r>
-              <a:rPr lang="en-GB" dirty="0">
+              <a:t>datasettene</a:t>
+            </a:r>
+            <a:endParaRPr lang="en-GB" dirty="0">
+              <a:sym typeface="Wingdings" pitchFamily="2" charset="2"/>
+            </a:endParaRPr>
+          </a:p>
+          <a:p>
+            <a:pPr marL="0" indent="0">
+              <a:buNone/>
+            </a:pPr>
+            <a:endParaRPr lang="en-GB" dirty="0">
+              <a:sym typeface="Wingdings" pitchFamily="2" charset="2"/>
+            </a:endParaRPr>
+          </a:p>
+          <a:p>
+            <a:r>
+              <a:rPr lang="en-NO" dirty="0">
                 <a:sym typeface="Wingdings" pitchFamily="2" charset="2"/>
               </a:rPr>
-              <a:t> ”1”  </a:t>
-            </a:r>
-            <a:endParaRPr lang="en-NO" dirty="0">
-              <a:sym typeface="Wingdings" pitchFamily="2" charset="2"/>
-            </a:endParaRPr>
+              <a:t>Se hvordan parametre endrer seg fra steg til steg (1- 5)</a:t>
+            </a:r>
           </a:p>
         </p:txBody>
       </p:sp>
@@ -3668,46 +3736,11 @@
         </p:blipFill>
         <p:spPr>
           <a:xfrm>
-            <a:off x="1109662" y="1985654"/>
+            <a:off x="1109662" y="2557154"/>
             <a:ext cx="7748588" cy="3529322"/>
           </a:xfrm>
         </p:spPr>
       </p:pic>
-      <p:sp>
-        <p:nvSpPr>
-          <p:cNvPr id="6" name="TextBox 5">
-            <a:extLst>
-              <a:ext uri="{FF2B5EF4-FFF2-40B4-BE49-F238E27FC236}">
-                <a16:creationId xmlns:a16="http://schemas.microsoft.com/office/drawing/2014/main" id="{60B517DB-6F41-22CC-273E-091937924402}"/>
-              </a:ext>
-            </a:extLst>
-          </p:cNvPr>
-          <p:cNvSpPr txBox="1"/>
-          <p:nvPr/>
-        </p:nvSpPr>
-        <p:spPr>
-          <a:xfrm>
-            <a:off x="1271588" y="5514976"/>
-            <a:ext cx="2786062" cy="584775"/>
-          </a:xfrm>
-          <a:prstGeom prst="rect">
-            <a:avLst/>
-          </a:prstGeom>
-          <a:noFill/>
-        </p:spPr>
-        <p:txBody>
-          <a:bodyPr wrap="square" rtlCol="0">
-            <a:spAutoFit/>
-          </a:bodyPr>
-          <a:lstStyle/>
-          <a:p>
-            <a:r>
-              <a:rPr lang="en-NO" sz="3200" dirty="0"/>
-              <a:t>Error: 7.7 e-07</a:t>
-            </a:r>
-          </a:p>
-        </p:txBody>
-      </p:sp>
       <p:sp>
         <p:nvSpPr>
           <p:cNvPr id="7" name="TextBox 6">
@@ -3861,7 +3894,7 @@
                   <a:srgbClr val="FFFF00"/>
                 </a:highlight>
               </a:rPr>
-              <a:t>Error: 7.7 e-07</a:t>
+              <a:t>Average error: 1.1 e-05</a:t>
             </a:r>
           </a:p>
         </p:txBody>
@@ -3955,48 +3988,6 @@
       </p:pic>
       <p:sp>
         <p:nvSpPr>
-          <p:cNvPr id="8" name="TextBox 7">
-            <a:extLst>
-              <a:ext uri="{FF2B5EF4-FFF2-40B4-BE49-F238E27FC236}">
-                <a16:creationId xmlns:a16="http://schemas.microsoft.com/office/drawing/2014/main" id="{8DB696D8-5F57-EE3B-CC18-6E138FE8CB7E}"/>
-              </a:ext>
-            </a:extLst>
-          </p:cNvPr>
-          <p:cNvSpPr txBox="1"/>
-          <p:nvPr/>
-        </p:nvSpPr>
-        <p:spPr>
-          <a:xfrm>
-            <a:off x="838200" y="5624507"/>
-            <a:ext cx="6100762" cy="584775"/>
-          </a:xfrm>
-          <a:prstGeom prst="rect">
-            <a:avLst/>
-          </a:prstGeom>
-          <a:noFill/>
-        </p:spPr>
-        <p:txBody>
-          <a:bodyPr wrap="square">
-            <a:spAutoFit/>
-          </a:bodyPr>
-          <a:lstStyle/>
-          <a:p>
-            <a:r>
-              <a:rPr lang="en-NO" sz="3200" dirty="0"/>
-              <a:t>Error: </a:t>
-            </a:r>
-            <a:r>
-              <a:rPr lang="en-GB" sz="3200" b="0" i="0" dirty="0">
-                <a:effectLst/>
-              </a:rPr>
-              <a:t>4.9 e-07</a:t>
-            </a:r>
-            <a:endParaRPr lang="en-NO" sz="3200" dirty="0"/>
-          </a:p>
-        </p:txBody>
-      </p:sp>
-      <p:sp>
-        <p:nvSpPr>
           <p:cNvPr id="10" name="TextBox 9">
             <a:extLst>
               <a:ext uri="{FF2B5EF4-FFF2-40B4-BE49-F238E27FC236}">
@@ -4148,7 +4139,15 @@
                   <a:srgbClr val="FFFF00"/>
                 </a:highlight>
               </a:rPr>
-              <a:t>Error: </a:t>
+              <a:t>Average error: </a:t>
+            </a:r>
+            <a:r>
+              <a:rPr lang="en-GB" sz="3200" dirty="0">
+                <a:highlight>
+                  <a:srgbClr val="FFFF00"/>
+                </a:highlight>
+              </a:rPr>
+              <a:t>2.0</a:t>
             </a:r>
             <a:r>
               <a:rPr lang="en-GB" sz="3200" b="0" i="0" dirty="0">
@@ -4157,7 +4156,7 @@
                   <a:srgbClr val="FFFF00"/>
                 </a:highlight>
               </a:rPr>
-              <a:t>4.9 e-07</a:t>
+              <a:t> e-06</a:t>
             </a:r>
             <a:endParaRPr lang="en-NO" sz="3200" dirty="0">
               <a:highlight>
@@ -4249,8 +4248,8 @@
         </p:blipFill>
         <p:spPr>
           <a:xfrm>
-            <a:off x="1028700" y="2057917"/>
-            <a:ext cx="9329738" cy="2569059"/>
+            <a:off x="1028700" y="2898258"/>
+            <a:ext cx="10325100" cy="2843144"/>
           </a:xfrm>
         </p:spPr>
       </p:pic>
@@ -4286,52 +4285,6 @@
               <a:rPr lang="en-NO" sz="2400" dirty="0"/>
               <a:t>(with inductance,  non-ideal capicitance and non-ideal Warburg)</a:t>
             </a:r>
-          </a:p>
-        </p:txBody>
-      </p:sp>
-      <p:sp>
-        <p:nvSpPr>
-          <p:cNvPr id="9" name="TextBox 8">
-            <a:extLst>
-              <a:ext uri="{FF2B5EF4-FFF2-40B4-BE49-F238E27FC236}">
-                <a16:creationId xmlns:a16="http://schemas.microsoft.com/office/drawing/2014/main" id="{0A7394E9-1723-55B9-92F3-56F53B89DB24}"/>
-              </a:ext>
-            </a:extLst>
-          </p:cNvPr>
-          <p:cNvSpPr txBox="1"/>
-          <p:nvPr/>
-        </p:nvSpPr>
-        <p:spPr>
-          <a:xfrm>
-            <a:off x="1235868" y="5708093"/>
-            <a:ext cx="6100762" cy="584775"/>
-          </a:xfrm>
-          <a:prstGeom prst="rect">
-            <a:avLst/>
-          </a:prstGeom>
-          <a:noFill/>
-        </p:spPr>
-        <p:txBody>
-          <a:bodyPr wrap="square">
-            <a:spAutoFit/>
-          </a:bodyPr>
-          <a:lstStyle/>
-          <a:p>
-            <a:r>
-              <a:rPr lang="en-NO" sz="3200" dirty="0"/>
-              <a:t>Error: </a:t>
-            </a:r>
-            <a:r>
-              <a:rPr lang="en-GB" sz="3200" dirty="0"/>
-              <a:t>5.0</a:t>
-            </a:r>
-            <a:r>
-              <a:rPr lang="en-GB" sz="3200" b="0" i="0" dirty="0">
-                <a:effectLst/>
-              </a:rPr>
-              <a:t> e-07</a:t>
-            </a:r>
-            <a:endParaRPr lang="en-NO" sz="3200" dirty="0"/>
           </a:p>
         </p:txBody>
       </p:sp>
@@ -4453,7 +4406,7 @@
                   <a:srgbClr val="FFFF00"/>
                 </a:highlight>
               </a:rPr>
-              <a:t>Error: </a:t>
+              <a:t>Average error: </a:t>
             </a:r>
             <a:r>
               <a:rPr lang="en-GB" sz="3200" dirty="0">
@@ -4461,7 +4414,7 @@
                   <a:srgbClr val="FFFF00"/>
                 </a:highlight>
               </a:rPr>
-              <a:t>5.0</a:t>
+              <a:t>1.8</a:t>
             </a:r>
             <a:r>
               <a:rPr lang="en-GB" sz="3200" b="0" i="0" dirty="0">
@@ -4470,7 +4423,7 @@
                   <a:srgbClr val="FFFF00"/>
                 </a:highlight>
               </a:rPr>
-              <a:t> e-07</a:t>
+              <a:t> e-06</a:t>
             </a:r>
             <a:endParaRPr lang="en-NO" sz="3200" dirty="0">
               <a:highlight>
@@ -4484,6 +4437,100 @@
     <p:extLst>
       <p:ext uri="{BB962C8B-B14F-4D97-AF65-F5344CB8AC3E}">
         <p14:creationId xmlns:p14="http://schemas.microsoft.com/office/powerpoint/2010/main" val="3489012343"/>
+      </p:ext>
+    </p:extLst>
+  </p:cSld>
+  <p:clrMapOvr>
+    <a:masterClrMapping/>
+  </p:clrMapOvr>
+</p:sld>
+</file>
+
+<file path=ppt/slides/slide9.xml><?xml version="1.0" encoding="utf-8"?>
+<p:sld xmlns:a="http://schemas.openxmlformats.org/drawingml/2006/main" xmlns:r="http://schemas.openxmlformats.org/officeDocument/2006/relationships" xmlns:p="http://schemas.openxmlformats.org/presentationml/2006/main">
+  <p:cSld>
+    <p:spTree>
+      <p:nvGrpSpPr>
+        <p:cNvPr id="1" name=""/>
+        <p:cNvGrpSpPr/>
+        <p:nvPr/>
+      </p:nvGrpSpPr>
+      <p:grpSpPr>
+        <a:xfrm>
+          <a:off x="0" y="0"/>
+          <a:ext cx="0" cy="0"/>
+          <a:chOff x="0" y="0"/>
+          <a:chExt cx="0" cy="0"/>
+        </a:xfrm>
+      </p:grpSpPr>
+      <p:sp>
+        <p:nvSpPr>
+          <p:cNvPr id="2" name="Title 1">
+            <a:extLst>
+              <a:ext uri="{FF2B5EF4-FFF2-40B4-BE49-F238E27FC236}">
+                <a16:creationId xmlns:a16="http://schemas.microsoft.com/office/drawing/2014/main" id="{E934F332-5DDF-B572-EE20-0E9C268B86D9}"/>
+              </a:ext>
+            </a:extLst>
+          </p:cNvPr>
+          <p:cNvSpPr>
+            <a:spLocks noGrp="1"/>
+          </p:cNvSpPr>
+          <p:nvPr>
+            <p:ph type="title"/>
+          </p:nvPr>
+        </p:nvSpPr>
+        <p:spPr/>
+        <p:txBody>
+          <a:bodyPr/>
+          <a:lstStyle/>
+          <a:p>
+            <a:r>
+              <a:rPr lang="en-NO" dirty="0"/>
+              <a:t>Conclusion</a:t>
+            </a:r>
+          </a:p>
+        </p:txBody>
+      </p:sp>
+      <p:sp>
+        <p:nvSpPr>
+          <p:cNvPr id="3" name="Content Placeholder 2">
+            <a:extLst>
+              <a:ext uri="{FF2B5EF4-FFF2-40B4-BE49-F238E27FC236}">
+                <a16:creationId xmlns:a16="http://schemas.microsoft.com/office/drawing/2014/main" id="{173CFE93-146D-2825-95B5-F89DE068094F}"/>
+              </a:ext>
+            </a:extLst>
+          </p:cNvPr>
+          <p:cNvSpPr>
+            <a:spLocks noGrp="1"/>
+          </p:cNvSpPr>
+          <p:nvPr>
+            <p:ph idx="1"/>
+          </p:nvPr>
+        </p:nvSpPr>
+        <p:spPr/>
+        <p:txBody>
+          <a:bodyPr/>
+          <a:lstStyle/>
+          <a:p>
+            <a:r>
+              <a:rPr lang="en-NO" dirty="0"/>
+              <a:t>The ECM model 3 gives the lowest sum of square difference --&gt; </a:t>
+            </a:r>
+            <a:r>
+              <a:rPr lang="en-NO" dirty="0">
+                <a:solidFill>
+                  <a:srgbClr val="FF0000"/>
+                </a:solidFill>
+              </a:rPr>
+              <a:t>lowest error </a:t>
+            </a:r>
+          </a:p>
+        </p:txBody>
+      </p:sp>
+    </p:spTree>
+    <p:extLst>
+      <p:ext uri="{BB962C8B-B14F-4D97-AF65-F5344CB8AC3E}">
+        <p14:creationId xmlns:p14="http://schemas.microsoft.com/office/powerpoint/2010/main" val="252708721"/>
       </p:ext>
     </p:extLst>
   </p:cSld>

</xml_diff>